<commit_message>
Add geoloc Update prezz
</commit_message>
<xml_diff>
--- a/XamarinPrez.pptx
+++ b/XamarinPrez.pptx
@@ -5,7 +5,7 @@
     <p:sldMasterId id="2147483697" r:id="rId4"/>
   </p:sldMasterIdLst>
   <p:notesMasterIdLst>
-    <p:notesMasterId r:id="rId19"/>
+    <p:notesMasterId r:id="rId20"/>
   </p:notesMasterIdLst>
   <p:sldIdLst>
     <p:sldId id="301" r:id="rId5"/>
@@ -13,15 +13,16 @@
     <p:sldId id="303" r:id="rId7"/>
     <p:sldId id="322" r:id="rId8"/>
     <p:sldId id="321" r:id="rId9"/>
-    <p:sldId id="312" r:id="rId10"/>
-    <p:sldId id="323" r:id="rId11"/>
-    <p:sldId id="304" r:id="rId12"/>
-    <p:sldId id="320" r:id="rId13"/>
-    <p:sldId id="319" r:id="rId14"/>
+    <p:sldId id="325" r:id="rId10"/>
+    <p:sldId id="326" r:id="rId11"/>
+    <p:sldId id="323" r:id="rId12"/>
+    <p:sldId id="324" r:id="rId13"/>
+    <p:sldId id="312" r:id="rId14"/>
     <p:sldId id="306" r:id="rId15"/>
     <p:sldId id="314" r:id="rId16"/>
     <p:sldId id="307" r:id="rId17"/>
-    <p:sldId id="316" r:id="rId18"/>
+    <p:sldId id="327" r:id="rId18"/>
+    <p:sldId id="316" r:id="rId19"/>
   </p:sldIdLst>
   <p:sldSz cx="9144000" cy="6858000" type="screen4x3"/>
   <p:notesSz cx="6858000" cy="9144000"/>
@@ -134,15 +135,15 @@
           <p14:sldIdLst>
             <p14:sldId id="322"/>
             <p14:sldId id="321"/>
-            <p14:sldId id="312"/>
+            <p14:sldId id="325"/>
+            <p14:sldId id="326"/>
           </p14:sldIdLst>
         </p14:section>
         <p14:section name="Xamarin particularité/intérêt (A)" id="{10A4AF4E-7A24-4046-B6FA-EB78517FBC90}">
           <p14:sldIdLst>
             <p14:sldId id="323"/>
-            <p14:sldId id="304"/>
-            <p14:sldId id="320"/>
-            <p14:sldId id="319"/>
+            <p14:sldId id="324"/>
+            <p14:sldId id="312"/>
           </p14:sldIdLst>
         </p14:section>
         <p14:section name="Comment çà marche ? (L)" id="{186D1988-B58C-45AB-A8AB-6C548955524D}">
@@ -157,6 +158,7 @@
         <p14:section name="Xamarin Forms (A)" id="{02DCAFF3-0F27-4266-8BDD-840EF2F3160B}">
           <p14:sldIdLst>
             <p14:sldId id="307"/>
+            <p14:sldId id="327"/>
             <p14:sldId id="316"/>
           </p14:sldIdLst>
         </p14:section>
@@ -1090,7 +1092,7 @@
           <a:p>
             <a:fld id="{DA053C50-9977-4DA0-B9F7-802FF13CA448}" type="datetimeFigureOut">
               <a:rPr lang="fr-FR" smtClean="0"/>
-              <a:t>29/09/2014</a:t>
+              <a:t>30/09/2014</a:t>
             </a:fld>
             <a:endParaRPr lang="fr-FR" dirty="0"/>
           </a:p>
@@ -36366,7 +36368,7 @@
           <a:p>
             <a:fld id="{1BB13C6A-5473-9749-9BED-835041A7AE5F}" type="datetimeFigureOut">
               <a:rPr lang="fr-FR" smtClean="0"/>
-              <a:t>29/09/2014</a:t>
+              <a:t>30/09/2014</a:t>
             </a:fld>
             <a:endParaRPr lang="fr-FR" dirty="0"/>
           </a:p>
@@ -39602,7 +39604,7 @@
           <a:p>
             <a:fld id="{1BB13C6A-5473-9749-9BED-835041A7AE5F}" type="datetimeFigureOut">
               <a:rPr lang="fr-FR" smtClean="0"/>
-              <a:t>29/09/2014</a:t>
+              <a:t>30/09/2014</a:t>
             </a:fld>
             <a:endParaRPr lang="fr-FR" dirty="0"/>
           </a:p>
@@ -40061,7 +40063,7 @@
                 </a:solidFill>
               </a:rPr>
               <a:pPr/>
-              <a:t>September 29, 2014</a:t>
+              <a:t>September 30, 2014</a:t>
             </a:fld>
             <a:endParaRPr lang="en-US" dirty="0">
               <a:solidFill>
@@ -42611,7 +42613,7 @@
       </p:grpSpPr>
       <p:sp>
         <p:nvSpPr>
-          <p:cNvPr id="2" name="Title 1"/>
+          <p:cNvPr id="2" name="Titre 1"/>
           <p:cNvSpPr>
             <a:spLocks noGrp="1"/>
           </p:cNvSpPr>
@@ -42621,330 +42623,126 @@
         </p:nvSpPr>
         <p:spPr/>
         <p:txBody>
-          <a:bodyPr>
-            <a:normAutofit/>
-          </a:bodyPr>
+          <a:bodyPr/>
           <a:lstStyle/>
           <a:p>
             <a:r>
-              <a:rPr lang="fr-FR" b="1" dirty="0" smtClean="0"/>
-              <a:t>Xamarin c’est quoi ?</a:t>
-            </a:r>
-            <a:endParaRPr lang="fr-FR" b="1" dirty="0"/>
+              <a:rPr lang="fr-FR" dirty="0" smtClean="0"/>
+              <a:t>Quel intérêt ?</a:t>
+            </a:r>
+            <a:endParaRPr lang="fr-FR" dirty="0"/>
           </a:p>
         </p:txBody>
       </p:sp>
       <p:sp>
         <p:nvSpPr>
-          <p:cNvPr id="7" name="Content Placeholder 2"/>
-          <p:cNvSpPr txBox="1">
-            <a:spLocks/>
+          <p:cNvPr id="3" name="Espace réservé du contenu 2"/>
+          <p:cNvSpPr>
+            <a:spLocks noGrp="1"/>
           </p:cNvSpPr>
-          <p:nvPr/>
+          <p:nvPr>
+            <p:ph idx="1"/>
+          </p:nvPr>
         </p:nvSpPr>
-        <p:spPr>
-          <a:xfrm>
-            <a:off x="532865" y="1757311"/>
-            <a:ext cx="6186955" cy="4529189"/>
-          </a:xfrm>
-          <a:prstGeom prst="rect">
-            <a:avLst/>
-          </a:prstGeom>
-        </p:spPr>
+        <p:spPr/>
         <p:txBody>
-          <a:bodyPr vert="horz" lIns="91440" tIns="45720" rIns="91440" bIns="45720" rtlCol="0">
-            <a:normAutofit fontScale="92500" lnSpcReduction="20000"/>
-          </a:bodyPr>
-          <a:lstStyle>
-            <a:lvl1pPr marL="342900" indent="-274320" algn="l" defTabSz="914400" rtl="0" eaLnBrk="1" latinLnBrk="0" hangingPunct="1">
-              <a:spcBef>
-                <a:spcPct val="20000"/>
-              </a:spcBef>
-              <a:buClr>
-                <a:schemeClr val="accent1"/>
-              </a:buClr>
-              <a:buSzPct val="100000"/>
-              <a:buFontTx/>
-              <a:buBlip>
-                <a:blip r:embed="rId2"/>
-              </a:buBlip>
-              <a:defRPr sz="2400" kern="1200">
-                <a:solidFill>
-                  <a:srgbClr val="5A0071"/>
-                </a:solidFill>
-                <a:latin typeface="Avenir Light"/>
-                <a:ea typeface="+mn-ea"/>
-                <a:cs typeface="Avenir Light"/>
-              </a:defRPr>
-            </a:lvl1pPr>
-            <a:lvl2pPr marL="708660" indent="-342900" algn="l" defTabSz="914400" rtl="0" eaLnBrk="1" latinLnBrk="0" hangingPunct="1">
-              <a:spcBef>
-                <a:spcPct val="20000"/>
-              </a:spcBef>
-              <a:buClr>
-                <a:schemeClr val="accent1"/>
-              </a:buClr>
-              <a:buSzPct val="100000"/>
-              <a:buFontTx/>
-              <a:buBlip>
-                <a:blip r:embed="rId2"/>
-              </a:buBlip>
-              <a:defRPr sz="2200" kern="1200">
-                <a:solidFill>
-                  <a:srgbClr val="5A0071"/>
-                </a:solidFill>
-                <a:latin typeface="Avenir Light"/>
-                <a:ea typeface="+mn-ea"/>
-                <a:cs typeface="Avenir Light"/>
-              </a:defRPr>
-            </a:lvl2pPr>
-            <a:lvl3pPr marL="914400" indent="-228600" algn="l" defTabSz="914400" rtl="0" eaLnBrk="1" latinLnBrk="0" hangingPunct="1">
-              <a:spcBef>
-                <a:spcPct val="20000"/>
-              </a:spcBef>
-              <a:buClrTx/>
-              <a:buSzPct val="76000"/>
-              <a:buFontTx/>
-              <a:buBlip>
-                <a:blip r:embed="rId3"/>
-              </a:buBlip>
-              <a:defRPr sz="2000" kern="1200">
-                <a:solidFill>
-                  <a:srgbClr val="5A0071"/>
-                </a:solidFill>
-                <a:latin typeface="Avenir Light"/>
-                <a:ea typeface="+mn-ea"/>
-                <a:cs typeface="Avenir Light"/>
-              </a:defRPr>
-            </a:lvl3pPr>
-            <a:lvl4pPr marL="1124712" indent="-228600" algn="l" defTabSz="914400" rtl="0" eaLnBrk="1" latinLnBrk="0" hangingPunct="1">
-              <a:spcBef>
-                <a:spcPct val="20000"/>
-              </a:spcBef>
-              <a:buClrTx/>
-              <a:buSzPct val="76000"/>
-              <a:buFontTx/>
-              <a:buBlip>
-                <a:blip r:embed="rId3"/>
-              </a:buBlip>
-              <a:defRPr sz="1800" kern="1200">
-                <a:solidFill>
-                  <a:srgbClr val="5A0071"/>
-                </a:solidFill>
-                <a:latin typeface="Avenir Light"/>
-                <a:ea typeface="+mn-ea"/>
-                <a:cs typeface="Avenir Light"/>
-              </a:defRPr>
-            </a:lvl4pPr>
-            <a:lvl5pPr marL="1325880" indent="-228600" algn="l" defTabSz="914400" rtl="0" eaLnBrk="1" latinLnBrk="0" hangingPunct="1">
-              <a:spcBef>
-                <a:spcPct val="20000"/>
-              </a:spcBef>
-              <a:buClrTx/>
-              <a:buSzPct val="76000"/>
-              <a:buFontTx/>
-              <a:buBlip>
-                <a:blip r:embed="rId3"/>
-              </a:buBlip>
-              <a:defRPr sz="1600" kern="1200" baseline="0">
-                <a:solidFill>
-                  <a:srgbClr val="5A0071"/>
-                </a:solidFill>
-                <a:latin typeface="Avenir Light"/>
-                <a:ea typeface="+mn-ea"/>
-                <a:cs typeface="Avenir Light"/>
-              </a:defRPr>
-            </a:lvl5pPr>
-            <a:lvl6pPr marL="1517904" indent="-228600" algn="l" defTabSz="914400" rtl="0" eaLnBrk="1" latinLnBrk="0" hangingPunct="1">
-              <a:spcBef>
-                <a:spcPct val="20000"/>
-              </a:spcBef>
-              <a:buClr>
-                <a:schemeClr val="accent1"/>
-              </a:buClr>
-              <a:buSzPct val="76000"/>
-              <a:buFont typeface="Wingdings 2" pitchFamily="18" charset="2"/>
-              <a:buChar char=""/>
-              <a:defRPr sz="1400" kern="1200">
-                <a:solidFill>
-                  <a:schemeClr val="tx2"/>
-                </a:solidFill>
-                <a:latin typeface="+mn-lt"/>
-                <a:ea typeface="+mn-ea"/>
-                <a:cs typeface="+mn-cs"/>
-              </a:defRPr>
-            </a:lvl6pPr>
-            <a:lvl7pPr marL="1719072" indent="-228600" algn="l" defTabSz="914400" rtl="0" eaLnBrk="1" latinLnBrk="0" hangingPunct="1">
-              <a:spcBef>
-                <a:spcPct val="20000"/>
-              </a:spcBef>
-              <a:buClr>
-                <a:schemeClr val="accent1"/>
-              </a:buClr>
-              <a:buSzPct val="76000"/>
-              <a:buFont typeface="Wingdings 2" pitchFamily="18" charset="2"/>
-              <a:buChar char=""/>
-              <a:defRPr sz="1400" kern="1200">
-                <a:solidFill>
-                  <a:schemeClr val="tx2"/>
-                </a:solidFill>
-                <a:latin typeface="+mn-lt"/>
-                <a:ea typeface="+mn-ea"/>
-                <a:cs typeface="+mn-cs"/>
-              </a:defRPr>
-            </a:lvl7pPr>
-            <a:lvl8pPr marL="1920240" indent="-228600" algn="l" defTabSz="914400" rtl="0" eaLnBrk="1" latinLnBrk="0" hangingPunct="1">
-              <a:spcBef>
-                <a:spcPct val="20000"/>
-              </a:spcBef>
-              <a:buClr>
-                <a:schemeClr val="accent1"/>
-              </a:buClr>
-              <a:buSzPct val="76000"/>
-              <a:buFont typeface="Wingdings 2" pitchFamily="18" charset="2"/>
-              <a:buChar char=""/>
-              <a:defRPr sz="1400" kern="1200">
-                <a:solidFill>
-                  <a:schemeClr val="tx2"/>
-                </a:solidFill>
-                <a:latin typeface="+mn-lt"/>
-                <a:ea typeface="+mn-ea"/>
-                <a:cs typeface="+mn-cs"/>
-              </a:defRPr>
-            </a:lvl8pPr>
-            <a:lvl9pPr marL="2121408" indent="-228600" algn="l" defTabSz="914400" rtl="0" eaLnBrk="1" latinLnBrk="0" hangingPunct="1">
-              <a:spcBef>
-                <a:spcPct val="20000"/>
-              </a:spcBef>
-              <a:buClr>
-                <a:schemeClr val="accent1"/>
-              </a:buClr>
-              <a:buSzPct val="76000"/>
-              <a:buFont typeface="Wingdings 2" pitchFamily="18" charset="2"/>
-              <a:buChar char=""/>
-              <a:defRPr sz="1400" kern="1200">
-                <a:solidFill>
-                  <a:schemeClr val="tx2"/>
-                </a:solidFill>
-                <a:latin typeface="+mn-lt"/>
-                <a:ea typeface="+mn-ea"/>
-                <a:cs typeface="+mn-cs"/>
-              </a:defRPr>
-            </a:lvl9pPr>
-          </a:lstStyle>
+          <a:bodyPr/>
+          <a:lstStyle/>
           <a:p>
             <a:r>
               <a:rPr lang="fr-FR" dirty="0" smtClean="0"/>
-              <a:t>Performances optimales</a:t>
-            </a:r>
-          </a:p>
-          <a:p>
-            <a:endParaRPr lang="fr-FR" dirty="0" smtClean="0"/>
+              <a:t>Intégré a Visual Studio</a:t>
+            </a:r>
           </a:p>
           <a:p>
             <a:r>
               <a:rPr lang="fr-FR" dirty="0" smtClean="0"/>
-              <a:t>« Look and </a:t>
-            </a:r>
-            <a:r>
-              <a:rPr lang="fr-FR" dirty="0" err="1" smtClean="0"/>
-              <a:t>Feel</a:t>
+              <a:t>C</a:t>
             </a:r>
             <a:r>
               <a:rPr lang="fr-FR" dirty="0" smtClean="0"/>
-              <a:t> » attendu</a:t>
-            </a:r>
-          </a:p>
-          <a:p>
+              <a:t>#</a:t>
+            </a:r>
+          </a:p>
+          <a:p>
+            <a:pPr lvl="1"/>
+            <a:r>
+              <a:rPr lang="fr-FR" dirty="0" smtClean="0"/>
+              <a:t>1 langage pour toutes </a:t>
+            </a:r>
+            <a:br>
+              <a:rPr lang="fr-FR" dirty="0" smtClean="0"/>
+            </a:br>
+            <a:r>
+              <a:rPr lang="fr-FR" dirty="0" smtClean="0"/>
+              <a:t>les plateformes</a:t>
+            </a:r>
+          </a:p>
+          <a:p>
+            <a:pPr lvl="1"/>
+            <a:r>
+              <a:rPr lang="fr-FR" dirty="0" smtClean="0"/>
+              <a:t>Peut de formation</a:t>
+            </a:r>
+          </a:p>
+          <a:p>
+            <a:r>
+              <a:rPr lang="fr-FR" dirty="0"/>
+              <a:t>Code </a:t>
+            </a:r>
+            <a:r>
+              <a:rPr lang="fr-FR" dirty="0" smtClean="0"/>
+              <a:t>réutilisable</a:t>
+            </a:r>
             <a:endParaRPr lang="fr-FR" dirty="0"/>
           </a:p>
           <a:p>
+            <a:pPr lvl="1"/>
             <a:r>
               <a:rPr lang="fr-FR" dirty="0" smtClean="0"/>
-              <a:t>80% de code commun</a:t>
+              <a:t>Mutualiser le code métier</a:t>
             </a:r>
           </a:p>
           <a:p>
             <a:pPr lvl="1"/>
             <a:r>
               <a:rPr lang="fr-FR" dirty="0" smtClean="0"/>
-              <a:t>Réduction des coûts</a:t>
+              <a:t>Framework existant</a:t>
             </a:r>
           </a:p>
           <a:p>
             <a:pPr lvl="2"/>
             <a:r>
               <a:rPr lang="fr-FR" dirty="0" smtClean="0"/>
-              <a:t>Maintenance</a:t>
+              <a:t>MVVM Light</a:t>
             </a:r>
           </a:p>
           <a:p>
             <a:pPr lvl="2"/>
             <a:r>
               <a:rPr lang="fr-FR" dirty="0" smtClean="0"/>
-              <a:t>Recrutement</a:t>
-            </a:r>
-          </a:p>
-          <a:p>
-            <a:pPr lvl="2"/>
-            <a:r>
-              <a:rPr lang="fr-FR" dirty="0" smtClean="0"/>
-              <a:t>Formation</a:t>
-            </a:r>
-          </a:p>
-          <a:p>
-            <a:endParaRPr lang="fr-FR" dirty="0"/>
-          </a:p>
-          <a:p>
-            <a:r>
-              <a:rPr lang="fr-FR" dirty="0" smtClean="0"/>
-              <a:t>Mise sur le marché rapide</a:t>
-            </a:r>
-          </a:p>
-          <a:p>
-            <a:pPr lvl="1"/>
-            <a:r>
-              <a:rPr lang="fr-FR" dirty="0" smtClean="0"/>
-              <a:t>Moins de code</a:t>
-            </a:r>
-          </a:p>
-          <a:p>
-            <a:pPr lvl="1"/>
-            <a:r>
-              <a:rPr lang="fr-FR" dirty="0" smtClean="0"/>
-              <a:t>Equipes rapidement opérationnelles</a:t>
-            </a:r>
-            <a:endParaRPr lang="fr-FR" dirty="0"/>
-          </a:p>
-          <a:p>
-            <a:endParaRPr lang="fr-FR" dirty="0" smtClean="0"/>
+              <a:t>Azure Mobile Services</a:t>
+            </a:r>
           </a:p>
         </p:txBody>
       </p:sp>
       <p:pic>
         <p:nvPicPr>
-          <p:cNvPr id="11" name="Picture 10"/>
+          <p:cNvPr id="4" name="Image 3"/>
           <p:cNvPicPr>
             <a:picLocks noChangeAspect="1"/>
           </p:cNvPicPr>
           <p:nvPr/>
         </p:nvPicPr>
-        <p:blipFill>
-          <a:blip r:embed="rId4">
-            <a:extLst>
-              <a:ext uri="{28A0092B-C50C-407E-A947-70E740481C1C}">
-                <a14:useLocalDpi xmlns:a14="http://schemas.microsoft.com/office/drawing/2010/main" val="0"/>
-              </a:ext>
-            </a:extLst>
-          </a:blip>
-          <a:stretch>
-            <a:fillRect/>
-          </a:stretch>
+        <p:blipFill rotWithShape="1">
+          <a:blip r:embed="rId2"/>
+          <a:srcRect l="76293" t="18304" r="1931" b="64285"/>
+          <a:stretch/>
         </p:blipFill>
         <p:spPr>
           <a:xfrm>
-            <a:off x="5415973" y="1685835"/>
-            <a:ext cx="2987962" cy="4129500"/>
+            <a:off x="4861663" y="1570274"/>
+            <a:ext cx="3982442" cy="1726315"/>
           </a:xfrm>
           <a:prstGeom prst="rect">
             <a:avLst/>
@@ -42954,7 +42752,7 @@
     </p:spTree>
     <p:extLst>
       <p:ext uri="{BB962C8B-B14F-4D97-AF65-F5344CB8AC3E}">
-        <p14:creationId xmlns:p14="http://schemas.microsoft.com/office/powerpoint/2010/main" val="724091539"/>
+        <p14:creationId xmlns:p14="http://schemas.microsoft.com/office/powerpoint/2010/main" val="1892568913"/>
       </p:ext>
     </p:extLst>
   </p:cSld>
@@ -43083,11 +42881,7 @@
             <a:pPr lvl="1"/>
             <a:r>
               <a:rPr lang="fr-FR" dirty="0" smtClean="0"/>
-              <a:t>Compilé </a:t>
-            </a:r>
-            <a:r>
-              <a:rPr lang="fr-FR" dirty="0" smtClean="0"/>
-              <a:t>en a l’</a:t>
+              <a:t>Compilé en a l’</a:t>
             </a:r>
             <a:r>
               <a:rPr lang="fr-FR" dirty="0" err="1" smtClean="0"/>
@@ -43103,11 +42897,7 @@
             </a:r>
             <a:r>
               <a:rPr lang="fr-FR" dirty="0" smtClean="0"/>
-              <a:t>Time</a:t>
-            </a:r>
-            <a:r>
-              <a:rPr lang="fr-FR" dirty="0" smtClean="0"/>
-              <a:t>)</a:t>
+              <a:t>Time)</a:t>
             </a:r>
             <a:endParaRPr lang="fr-FR" dirty="0"/>
           </a:p>
@@ -43273,7 +43063,11 @@
           <a:p>
             <a:r>
               <a:rPr lang="fr-FR" dirty="0" smtClean="0"/>
-              <a:t>Kata Xamarin</a:t>
+              <a:t>Xamarin </a:t>
+            </a:r>
+            <a:r>
+              <a:rPr lang="fr-FR" dirty="0" err="1" smtClean="0"/>
+              <a:t>Forms</a:t>
             </a:r>
             <a:endParaRPr lang="fr-FR" dirty="0"/>
           </a:p>
@@ -43328,6 +43122,135 @@
 </file>
 
 <file path=ppt/slides/slide14.xml><?xml version="1.0" encoding="utf-8"?>
+<p:sld xmlns:a="http://schemas.openxmlformats.org/drawingml/2006/main" xmlns:r="http://schemas.openxmlformats.org/officeDocument/2006/relationships" xmlns:p="http://schemas.openxmlformats.org/presentationml/2006/main">
+  <p:cSld>
+    <p:spTree>
+      <p:nvGrpSpPr>
+        <p:cNvPr id="1" name=""/>
+        <p:cNvGrpSpPr/>
+        <p:nvPr/>
+      </p:nvGrpSpPr>
+      <p:grpSpPr>
+        <a:xfrm>
+          <a:off x="0" y="0"/>
+          <a:ext cx="0" cy="0"/>
+          <a:chOff x="0" y="0"/>
+          <a:chExt cx="0" cy="0"/>
+        </a:xfrm>
+      </p:grpSpPr>
+      <p:sp>
+        <p:nvSpPr>
+          <p:cNvPr id="2" name="Titre 1"/>
+          <p:cNvSpPr>
+            <a:spLocks noGrp="1"/>
+          </p:cNvSpPr>
+          <p:nvPr>
+            <p:ph type="title"/>
+          </p:nvPr>
+        </p:nvSpPr>
+        <p:spPr/>
+        <p:txBody>
+          <a:bodyPr/>
+          <a:lstStyle/>
+          <a:p>
+            <a:r>
+              <a:rPr lang="fr-FR" dirty="0" smtClean="0"/>
+              <a:t>Xamarin </a:t>
+            </a:r>
+            <a:r>
+              <a:rPr lang="fr-FR" dirty="0" err="1" smtClean="0"/>
+              <a:t>Forms</a:t>
+            </a:r>
+            <a:endParaRPr lang="fr-FR" dirty="0"/>
+          </a:p>
+        </p:txBody>
+      </p:sp>
+      <p:sp>
+        <p:nvSpPr>
+          <p:cNvPr id="4" name="Espace réservé du texte 3"/>
+          <p:cNvSpPr>
+            <a:spLocks noGrp="1"/>
+          </p:cNvSpPr>
+          <p:nvPr>
+            <p:ph idx="1"/>
+          </p:nvPr>
+        </p:nvSpPr>
+        <p:spPr/>
+        <p:txBody>
+          <a:bodyPr/>
+          <a:lstStyle/>
+          <a:p>
+            <a:r>
+              <a:rPr lang="fr-FR" dirty="0" smtClean="0"/>
+              <a:t>Un seul code UI</a:t>
+            </a:r>
+          </a:p>
+          <a:p>
+            <a:r>
+              <a:rPr lang="fr-FR" dirty="0" smtClean="0"/>
+              <a:t>XAML</a:t>
+            </a:r>
+          </a:p>
+          <a:p>
+            <a:r>
+              <a:rPr lang="fr-FR" dirty="0" smtClean="0"/>
+              <a:t>Pattern MVVM</a:t>
+            </a:r>
+            <a:endParaRPr lang="fr-FR" dirty="0"/>
+          </a:p>
+        </p:txBody>
+      </p:sp>
+      <p:pic>
+        <p:nvPicPr>
+          <p:cNvPr id="3" name="Image 2"/>
+          <p:cNvPicPr>
+            <a:picLocks noChangeAspect="1"/>
+          </p:cNvPicPr>
+          <p:nvPr/>
+        </p:nvPicPr>
+        <p:blipFill>
+          <a:blip r:embed="rId2">
+            <a:extLst>
+              <a:ext uri="{28A0092B-C50C-407E-A947-70E740481C1C}">
+                <a14:useLocalDpi xmlns:a14="http://schemas.microsoft.com/office/drawing/2010/main" val="0"/>
+              </a:ext>
+            </a:extLst>
+          </a:blip>
+          <a:stretch>
+            <a:fillRect/>
+          </a:stretch>
+        </p:blipFill>
+        <p:spPr>
+          <a:xfrm>
+            <a:off x="3207950" y="2023582"/>
+            <a:ext cx="5735390" cy="3809047"/>
+          </a:xfrm>
+          <a:prstGeom prst="rect">
+            <a:avLst/>
+          </a:prstGeom>
+        </p:spPr>
+      </p:pic>
+    </p:spTree>
+    <p:extLst>
+      <p:ext uri="{BB962C8B-B14F-4D97-AF65-F5344CB8AC3E}">
+        <p14:creationId xmlns:p14="http://schemas.microsoft.com/office/powerpoint/2010/main" val="1160767923"/>
+      </p:ext>
+    </p:extLst>
+  </p:cSld>
+  <p:clrMapOvr>
+    <a:masterClrMapping/>
+  </p:clrMapOvr>
+  <p:timing>
+    <p:tnLst>
+      <p:par>
+        <p:cTn id="1" dur="indefinite" restart="never" nodeType="tmRoot"/>
+      </p:par>
+    </p:tnLst>
+  </p:timing>
+</p:sld>
+</file>
+
+<file path=ppt/slides/slide15.xml><?xml version="1.0" encoding="utf-8"?>
 <p:sld xmlns:a="http://schemas.openxmlformats.org/drawingml/2006/main" xmlns:r="http://schemas.openxmlformats.org/officeDocument/2006/relationships" xmlns:p="http://schemas.openxmlformats.org/presentationml/2006/main">
   <p:cSld>
     <p:spTree>
@@ -43987,7 +43910,7 @@
           <a:p>
             <a:r>
               <a:rPr lang="fr-FR" dirty="0" smtClean="0"/>
-              <a:t>Quel intérêt ?</a:t>
+              <a:t>Le Mobile Aujourd’hui ?</a:t>
             </a:r>
             <a:endParaRPr lang="fr-FR" dirty="0"/>
           </a:p>
@@ -44010,39 +43933,58 @@
           <a:p>
             <a:r>
               <a:rPr lang="fr-FR" dirty="0" smtClean="0"/>
-              <a:t>Intégré a Visual Studio</a:t>
-            </a:r>
-          </a:p>
-          <a:p>
+              <a:t>Web Mobile (HTML5/CSS3)</a:t>
+            </a:r>
+          </a:p>
+          <a:p>
+            <a:r>
+              <a:rPr lang="fr-FR" dirty="0" err="1" smtClean="0"/>
+              <a:t>Magic</a:t>
+            </a:r>
             <a:r>
               <a:rPr lang="fr-FR" dirty="0" smtClean="0"/>
-              <a:t>Code réutilisable</a:t>
-            </a:r>
-          </a:p>
-          <a:p>
+              <a:t> Box (Write Once, </a:t>
+            </a:r>
+            <a:r>
+              <a:rPr lang="fr-FR" dirty="0" err="1" smtClean="0"/>
+              <a:t>Run</a:t>
+            </a:r>
             <a:r>
               <a:rPr lang="fr-FR" dirty="0" smtClean="0"/>
-              <a:t>C</a:t>
+              <a:t> </a:t>
+            </a:r>
+            <a:r>
+              <a:rPr lang="fr-FR" dirty="0" err="1" smtClean="0"/>
+              <a:t>Anywhere</a:t>
             </a:r>
             <a:r>
               <a:rPr lang="fr-FR" dirty="0" smtClean="0"/>
-              <a:t>#</a:t>
-            </a:r>
-          </a:p>
-          <a:p>
-            <a:pPr lvl="1"/>
-            <a:r>
-              <a:rPr lang="fr-FR" dirty="0" smtClean="0"/>
-              <a:t>Réutiliser les développeurs</a:t>
-            </a:r>
-            <a:endParaRPr lang="fr-FR" dirty="0"/>
+              <a:t>)</a:t>
+            </a:r>
+          </a:p>
+          <a:p>
+            <a:r>
+              <a:rPr lang="fr-FR" sz="2400" kern="1200" dirty="0" smtClean="0">
+                <a:solidFill>
+                  <a:srgbClr val="5A0071"/>
+                </a:solidFill>
+                <a:effectLst/>
+                <a:latin typeface="Avenir Light"/>
+                <a:ea typeface="+mn-ea"/>
+                <a:cs typeface="Avenir Light"/>
+              </a:rPr>
+              <a:t>Application Native</a:t>
+            </a:r>
+            <a:endParaRPr lang="fr-FR" sz="2400" dirty="0" smtClean="0">
+              <a:effectLst/>
+            </a:endParaRPr>
           </a:p>
         </p:txBody>
       </p:sp>
     </p:spTree>
     <p:extLst>
       <p:ext uri="{BB962C8B-B14F-4D97-AF65-F5344CB8AC3E}">
-        <p14:creationId xmlns:p14="http://schemas.microsoft.com/office/powerpoint/2010/main" val="1892568913"/>
+        <p14:creationId xmlns:p14="http://schemas.microsoft.com/office/powerpoint/2010/main" val="2622595231"/>
       </p:ext>
     </p:extLst>
   </p:cSld>
@@ -44060,219 +44002,6 @@
 </file>
 
 <file path=ppt/slides/slide7.xml><?xml version="1.0" encoding="utf-8"?>
-<p:sld xmlns:a="http://schemas.openxmlformats.org/drawingml/2006/main" xmlns:r="http://schemas.openxmlformats.org/officeDocument/2006/relationships" xmlns:p="http://schemas.openxmlformats.org/presentationml/2006/main">
-  <p:cSld>
-    <p:spTree>
-      <p:nvGrpSpPr>
-        <p:cNvPr id="1" name=""/>
-        <p:cNvGrpSpPr/>
-        <p:nvPr/>
-      </p:nvGrpSpPr>
-      <p:grpSpPr>
-        <a:xfrm>
-          <a:off x="0" y="0"/>
-          <a:ext cx="0" cy="0"/>
-          <a:chOff x="0" y="0"/>
-          <a:chExt cx="0" cy="0"/>
-        </a:xfrm>
-      </p:grpSpPr>
-      <p:sp>
-        <p:nvSpPr>
-          <p:cNvPr id="4" name="Espace réservé du texte 3"/>
-          <p:cNvSpPr>
-            <a:spLocks noGrp="1"/>
-          </p:cNvSpPr>
-          <p:nvPr>
-            <p:ph type="body" sz="quarter" idx="10"/>
-          </p:nvPr>
-        </p:nvSpPr>
-        <p:spPr/>
-        <p:txBody>
-          <a:bodyPr/>
-          <a:lstStyle/>
-          <a:p>
-            <a:r>
-              <a:rPr lang="fr-FR" dirty="0" smtClean="0"/>
-              <a:t>Xamarin c’est quoi ?</a:t>
-            </a:r>
-            <a:endParaRPr lang="fr-FR" dirty="0"/>
-          </a:p>
-        </p:txBody>
-      </p:sp>
-      <p:sp>
-        <p:nvSpPr>
-          <p:cNvPr id="2" name="Titre 1"/>
-          <p:cNvSpPr>
-            <a:spLocks noGrp="1"/>
-          </p:cNvSpPr>
-          <p:nvPr>
-            <p:ph type="title" idx="4294967295"/>
-          </p:nvPr>
-        </p:nvSpPr>
-        <p:spPr>
-          <a:xfrm>
-            <a:off x="0" y="150813"/>
-            <a:ext cx="4851400" cy="769937"/>
-          </a:xfrm>
-        </p:spPr>
-        <p:txBody>
-          <a:bodyPr/>
-          <a:lstStyle/>
-          <a:p>
-            <a:r>
-              <a:rPr lang="fr-FR" dirty="0" smtClean="0"/>
-              <a:t>Kata Xamarin</a:t>
-            </a:r>
-            <a:endParaRPr lang="fr-FR" dirty="0"/>
-          </a:p>
-        </p:txBody>
-      </p:sp>
-    </p:spTree>
-    <p:extLst>
-      <p:ext uri="{BB962C8B-B14F-4D97-AF65-F5344CB8AC3E}">
-        <p14:creationId xmlns:p14="http://schemas.microsoft.com/office/powerpoint/2010/main" val="3157311224"/>
-      </p:ext>
-    </p:extLst>
-  </p:cSld>
-  <p:clrMapOvr>
-    <a:masterClrMapping/>
-  </p:clrMapOvr>
-  <p:timing>
-    <p:tnLst>
-      <p:par>
-        <p:cTn id="1" dur="indefinite" restart="never" nodeType="tmRoot"/>
-      </p:par>
-    </p:tnLst>
-  </p:timing>
-</p:sld>
-</file>
-
-<file path=ppt/slides/slide8.xml><?xml version="1.0" encoding="utf-8"?>
-<p:sld xmlns:a="http://schemas.openxmlformats.org/drawingml/2006/main" xmlns:r="http://schemas.openxmlformats.org/officeDocument/2006/relationships" xmlns:p="http://schemas.openxmlformats.org/presentationml/2006/main">
-  <p:cSld>
-    <p:spTree>
-      <p:nvGrpSpPr>
-        <p:cNvPr id="1" name=""/>
-        <p:cNvGrpSpPr/>
-        <p:nvPr/>
-      </p:nvGrpSpPr>
-      <p:grpSpPr>
-        <a:xfrm>
-          <a:off x="0" y="0"/>
-          <a:ext cx="0" cy="0"/>
-          <a:chOff x="0" y="0"/>
-          <a:chExt cx="0" cy="0"/>
-        </a:xfrm>
-      </p:grpSpPr>
-      <p:sp>
-        <p:nvSpPr>
-          <p:cNvPr id="2" name="Titre 1"/>
-          <p:cNvSpPr>
-            <a:spLocks noGrp="1"/>
-          </p:cNvSpPr>
-          <p:nvPr>
-            <p:ph type="title"/>
-          </p:nvPr>
-        </p:nvSpPr>
-        <p:spPr/>
-        <p:txBody>
-          <a:bodyPr/>
-          <a:lstStyle/>
-          <a:p>
-            <a:r>
-              <a:rPr lang="fr-FR" dirty="0" smtClean="0"/>
-              <a:t>Le Mobile Aujourd’hui ?</a:t>
-            </a:r>
-            <a:endParaRPr lang="fr-FR" dirty="0"/>
-          </a:p>
-        </p:txBody>
-      </p:sp>
-      <p:sp>
-        <p:nvSpPr>
-          <p:cNvPr id="3" name="Espace réservé du contenu 2"/>
-          <p:cNvSpPr>
-            <a:spLocks noGrp="1"/>
-          </p:cNvSpPr>
-          <p:nvPr>
-            <p:ph idx="1"/>
-          </p:nvPr>
-        </p:nvSpPr>
-        <p:spPr/>
-        <p:txBody>
-          <a:bodyPr/>
-          <a:lstStyle/>
-          <a:p>
-            <a:r>
-              <a:rPr lang="fr-FR" dirty="0" smtClean="0"/>
-              <a:t>Web Mobile (HTML5/CSS3)</a:t>
-            </a:r>
-          </a:p>
-          <a:p>
-            <a:r>
-              <a:rPr lang="fr-FR" dirty="0" err="1" smtClean="0"/>
-              <a:t>Magic</a:t>
-            </a:r>
-            <a:r>
-              <a:rPr lang="fr-FR" dirty="0" smtClean="0"/>
-              <a:t> Box (Write Once, </a:t>
-            </a:r>
-            <a:r>
-              <a:rPr lang="fr-FR" dirty="0" err="1" smtClean="0"/>
-              <a:t>Run</a:t>
-            </a:r>
-            <a:r>
-              <a:rPr lang="fr-FR" dirty="0" smtClean="0"/>
-              <a:t> </a:t>
-            </a:r>
-            <a:r>
-              <a:rPr lang="fr-FR" dirty="0" err="1" smtClean="0"/>
-              <a:t>Anywhere</a:t>
-            </a:r>
-            <a:r>
-              <a:rPr lang="fr-FR" dirty="0" smtClean="0"/>
-              <a:t>)</a:t>
-            </a:r>
-          </a:p>
-          <a:p>
-            <a:r>
-              <a:rPr lang="fr-FR" sz="2400" kern="1200" dirty="0" smtClean="0">
-                <a:solidFill>
-                  <a:srgbClr val="5A0071"/>
-                </a:solidFill>
-                <a:effectLst/>
-                <a:latin typeface="Avenir Light"/>
-                <a:ea typeface="+mn-ea"/>
-                <a:cs typeface="Avenir Light"/>
-              </a:rPr>
-              <a:t>Application Native</a:t>
-            </a:r>
-            <a:endParaRPr lang="fr-FR" sz="2400" dirty="0" smtClean="0">
-              <a:effectLst/>
-            </a:endParaRPr>
-          </a:p>
-        </p:txBody>
-      </p:sp>
-    </p:spTree>
-    <p:extLst>
-      <p:ext uri="{BB962C8B-B14F-4D97-AF65-F5344CB8AC3E}">
-        <p14:creationId xmlns:p14="http://schemas.microsoft.com/office/powerpoint/2010/main" val="2043781149"/>
-      </p:ext>
-    </p:extLst>
-  </p:cSld>
-  <p:clrMapOvr>
-    <a:masterClrMapping/>
-  </p:clrMapOvr>
-  <p:timing>
-    <p:tnLst>
-      <p:par>
-        <p:cTn id="1" dur="indefinite" restart="never" nodeType="tmRoot"/>
-      </p:par>
-    </p:tnLst>
-  </p:timing>
-</p:sld>
-</file>
-
-<file path=ppt/slides/slide9.xml><?xml version="1.0" encoding="utf-8"?>
 <p:sld xmlns:a="http://schemas.openxmlformats.org/drawingml/2006/main" xmlns:r="http://schemas.openxmlformats.org/officeDocument/2006/relationships" xmlns:p="http://schemas.openxmlformats.org/presentationml/2006/main">
   <p:cSld>
     <p:spTree>
@@ -44709,7 +44438,490 @@
     </p:spTree>
     <p:extLst>
       <p:ext uri="{BB962C8B-B14F-4D97-AF65-F5344CB8AC3E}">
-        <p14:creationId xmlns:p14="http://schemas.microsoft.com/office/powerpoint/2010/main" val="2523585468"/>
+        <p14:creationId xmlns:p14="http://schemas.microsoft.com/office/powerpoint/2010/main" val="3430975631"/>
+      </p:ext>
+    </p:extLst>
+  </p:cSld>
+  <p:clrMapOvr>
+    <a:masterClrMapping/>
+  </p:clrMapOvr>
+  <p:timing>
+    <p:tnLst>
+      <p:par>
+        <p:cTn id="1" dur="indefinite" restart="never" nodeType="tmRoot"/>
+      </p:par>
+    </p:tnLst>
+  </p:timing>
+</p:sld>
+</file>
+
+<file path=ppt/slides/slide8.xml><?xml version="1.0" encoding="utf-8"?>
+<p:sld xmlns:a="http://schemas.openxmlformats.org/drawingml/2006/main" xmlns:r="http://schemas.openxmlformats.org/officeDocument/2006/relationships" xmlns:p="http://schemas.openxmlformats.org/presentationml/2006/main">
+  <p:cSld>
+    <p:spTree>
+      <p:nvGrpSpPr>
+        <p:cNvPr id="1" name=""/>
+        <p:cNvGrpSpPr/>
+        <p:nvPr/>
+      </p:nvGrpSpPr>
+      <p:grpSpPr>
+        <a:xfrm>
+          <a:off x="0" y="0"/>
+          <a:ext cx="0" cy="0"/>
+          <a:chOff x="0" y="0"/>
+          <a:chExt cx="0" cy="0"/>
+        </a:xfrm>
+      </p:grpSpPr>
+      <p:sp>
+        <p:nvSpPr>
+          <p:cNvPr id="4" name="Espace réservé du texte 3"/>
+          <p:cNvSpPr>
+            <a:spLocks noGrp="1"/>
+          </p:cNvSpPr>
+          <p:nvPr>
+            <p:ph type="body" sz="quarter" idx="10"/>
+          </p:nvPr>
+        </p:nvSpPr>
+        <p:spPr/>
+        <p:txBody>
+          <a:bodyPr/>
+          <a:lstStyle/>
+          <a:p>
+            <a:r>
+              <a:rPr lang="fr-FR" dirty="0" smtClean="0"/>
+              <a:t>Xamarin </a:t>
+            </a:r>
+            <a:r>
+              <a:rPr lang="fr-FR" dirty="0" smtClean="0"/>
+              <a:t>particularité </a:t>
+            </a:r>
+            <a:r>
+              <a:rPr lang="fr-FR" dirty="0" smtClean="0"/>
+              <a:t>?</a:t>
+            </a:r>
+            <a:endParaRPr lang="fr-FR" dirty="0"/>
+          </a:p>
+        </p:txBody>
+      </p:sp>
+      <p:sp>
+        <p:nvSpPr>
+          <p:cNvPr id="2" name="Titre 1"/>
+          <p:cNvSpPr>
+            <a:spLocks noGrp="1"/>
+          </p:cNvSpPr>
+          <p:nvPr>
+            <p:ph type="title" idx="4294967295"/>
+          </p:nvPr>
+        </p:nvSpPr>
+        <p:spPr>
+          <a:xfrm>
+            <a:off x="0" y="150813"/>
+            <a:ext cx="4851400" cy="769937"/>
+          </a:xfrm>
+        </p:spPr>
+        <p:txBody>
+          <a:bodyPr/>
+          <a:lstStyle/>
+          <a:p>
+            <a:r>
+              <a:rPr lang="fr-FR" dirty="0" smtClean="0"/>
+              <a:t>Kata Xamarin</a:t>
+            </a:r>
+            <a:endParaRPr lang="fr-FR" dirty="0"/>
+          </a:p>
+        </p:txBody>
+      </p:sp>
+    </p:spTree>
+    <p:extLst>
+      <p:ext uri="{BB962C8B-B14F-4D97-AF65-F5344CB8AC3E}">
+        <p14:creationId xmlns:p14="http://schemas.microsoft.com/office/powerpoint/2010/main" val="3157311224"/>
+      </p:ext>
+    </p:extLst>
+  </p:cSld>
+  <p:clrMapOvr>
+    <a:masterClrMapping/>
+  </p:clrMapOvr>
+  <p:timing>
+    <p:tnLst>
+      <p:par>
+        <p:cTn id="1" dur="indefinite" restart="never" nodeType="tmRoot"/>
+      </p:par>
+    </p:tnLst>
+  </p:timing>
+</p:sld>
+</file>
+
+<file path=ppt/slides/slide9.xml><?xml version="1.0" encoding="utf-8"?>
+<p:sld xmlns:a="http://schemas.openxmlformats.org/drawingml/2006/main" xmlns:r="http://schemas.openxmlformats.org/officeDocument/2006/relationships" xmlns:p="http://schemas.openxmlformats.org/presentationml/2006/main">
+  <p:cSld>
+    <p:spTree>
+      <p:nvGrpSpPr>
+        <p:cNvPr id="1" name=""/>
+        <p:cNvGrpSpPr/>
+        <p:nvPr/>
+      </p:nvGrpSpPr>
+      <p:grpSpPr>
+        <a:xfrm>
+          <a:off x="0" y="0"/>
+          <a:ext cx="0" cy="0"/>
+          <a:chOff x="0" y="0"/>
+          <a:chExt cx="0" cy="0"/>
+        </a:xfrm>
+      </p:grpSpPr>
+      <p:sp>
+        <p:nvSpPr>
+          <p:cNvPr id="2" name="Title 1"/>
+          <p:cNvSpPr>
+            <a:spLocks noGrp="1"/>
+          </p:cNvSpPr>
+          <p:nvPr>
+            <p:ph type="title"/>
+          </p:nvPr>
+        </p:nvSpPr>
+        <p:spPr/>
+        <p:txBody>
+          <a:bodyPr>
+            <a:normAutofit/>
+          </a:bodyPr>
+          <a:lstStyle/>
+          <a:p>
+            <a:r>
+              <a:rPr lang="fr-FR" b="1" dirty="0" smtClean="0"/>
+              <a:t>Xamarin </a:t>
+            </a:r>
+            <a:r>
+              <a:rPr lang="fr-FR" b="1" dirty="0" smtClean="0"/>
+              <a:t>particularité </a:t>
+            </a:r>
+            <a:r>
+              <a:rPr lang="fr-FR" b="1" dirty="0" smtClean="0"/>
+              <a:t>?</a:t>
+            </a:r>
+            <a:endParaRPr lang="fr-FR" b="1" dirty="0"/>
+          </a:p>
+        </p:txBody>
+      </p:sp>
+      <p:sp>
+        <p:nvSpPr>
+          <p:cNvPr id="7" name="Content Placeholder 2"/>
+          <p:cNvSpPr txBox="1">
+            <a:spLocks/>
+          </p:cNvSpPr>
+          <p:nvPr/>
+        </p:nvSpPr>
+        <p:spPr>
+          <a:xfrm>
+            <a:off x="532865" y="1757311"/>
+            <a:ext cx="6186955" cy="4529189"/>
+          </a:xfrm>
+          <a:prstGeom prst="rect">
+            <a:avLst/>
+          </a:prstGeom>
+        </p:spPr>
+        <p:txBody>
+          <a:bodyPr vert="horz" lIns="91440" tIns="45720" rIns="91440" bIns="45720" rtlCol="0">
+            <a:normAutofit fontScale="92500" lnSpcReduction="20000"/>
+          </a:bodyPr>
+          <a:lstStyle>
+            <a:lvl1pPr marL="342900" indent="-274320" algn="l" defTabSz="914400" rtl="0" eaLnBrk="1" latinLnBrk="0" hangingPunct="1">
+              <a:spcBef>
+                <a:spcPct val="20000"/>
+              </a:spcBef>
+              <a:buClr>
+                <a:schemeClr val="accent1"/>
+              </a:buClr>
+              <a:buSzPct val="100000"/>
+              <a:buFontTx/>
+              <a:buBlip>
+                <a:blip r:embed="rId2"/>
+              </a:buBlip>
+              <a:defRPr sz="2400" kern="1200">
+                <a:solidFill>
+                  <a:srgbClr val="5A0071"/>
+                </a:solidFill>
+                <a:latin typeface="Avenir Light"/>
+                <a:ea typeface="+mn-ea"/>
+                <a:cs typeface="Avenir Light"/>
+              </a:defRPr>
+            </a:lvl1pPr>
+            <a:lvl2pPr marL="708660" indent="-342900" algn="l" defTabSz="914400" rtl="0" eaLnBrk="1" latinLnBrk="0" hangingPunct="1">
+              <a:spcBef>
+                <a:spcPct val="20000"/>
+              </a:spcBef>
+              <a:buClr>
+                <a:schemeClr val="accent1"/>
+              </a:buClr>
+              <a:buSzPct val="100000"/>
+              <a:buFontTx/>
+              <a:buBlip>
+                <a:blip r:embed="rId2"/>
+              </a:buBlip>
+              <a:defRPr sz="2200" kern="1200">
+                <a:solidFill>
+                  <a:srgbClr val="5A0071"/>
+                </a:solidFill>
+                <a:latin typeface="Avenir Light"/>
+                <a:ea typeface="+mn-ea"/>
+                <a:cs typeface="Avenir Light"/>
+              </a:defRPr>
+            </a:lvl2pPr>
+            <a:lvl3pPr marL="914400" indent="-228600" algn="l" defTabSz="914400" rtl="0" eaLnBrk="1" latinLnBrk="0" hangingPunct="1">
+              <a:spcBef>
+                <a:spcPct val="20000"/>
+              </a:spcBef>
+              <a:buClrTx/>
+              <a:buSzPct val="76000"/>
+              <a:buFontTx/>
+              <a:buBlip>
+                <a:blip r:embed="rId3"/>
+              </a:buBlip>
+              <a:defRPr sz="2000" kern="1200">
+                <a:solidFill>
+                  <a:srgbClr val="5A0071"/>
+                </a:solidFill>
+                <a:latin typeface="Avenir Light"/>
+                <a:ea typeface="+mn-ea"/>
+                <a:cs typeface="Avenir Light"/>
+              </a:defRPr>
+            </a:lvl3pPr>
+            <a:lvl4pPr marL="1124712" indent="-228600" algn="l" defTabSz="914400" rtl="0" eaLnBrk="1" latinLnBrk="0" hangingPunct="1">
+              <a:spcBef>
+                <a:spcPct val="20000"/>
+              </a:spcBef>
+              <a:buClrTx/>
+              <a:buSzPct val="76000"/>
+              <a:buFontTx/>
+              <a:buBlip>
+                <a:blip r:embed="rId3"/>
+              </a:buBlip>
+              <a:defRPr sz="1800" kern="1200">
+                <a:solidFill>
+                  <a:srgbClr val="5A0071"/>
+                </a:solidFill>
+                <a:latin typeface="Avenir Light"/>
+                <a:ea typeface="+mn-ea"/>
+                <a:cs typeface="Avenir Light"/>
+              </a:defRPr>
+            </a:lvl4pPr>
+            <a:lvl5pPr marL="1325880" indent="-228600" algn="l" defTabSz="914400" rtl="0" eaLnBrk="1" latinLnBrk="0" hangingPunct="1">
+              <a:spcBef>
+                <a:spcPct val="20000"/>
+              </a:spcBef>
+              <a:buClrTx/>
+              <a:buSzPct val="76000"/>
+              <a:buFontTx/>
+              <a:buBlip>
+                <a:blip r:embed="rId3"/>
+              </a:buBlip>
+              <a:defRPr sz="1600" kern="1200" baseline="0">
+                <a:solidFill>
+                  <a:srgbClr val="5A0071"/>
+                </a:solidFill>
+                <a:latin typeface="Avenir Light"/>
+                <a:ea typeface="+mn-ea"/>
+                <a:cs typeface="Avenir Light"/>
+              </a:defRPr>
+            </a:lvl5pPr>
+            <a:lvl6pPr marL="1517904" indent="-228600" algn="l" defTabSz="914400" rtl="0" eaLnBrk="1" latinLnBrk="0" hangingPunct="1">
+              <a:spcBef>
+                <a:spcPct val="20000"/>
+              </a:spcBef>
+              <a:buClr>
+                <a:schemeClr val="accent1"/>
+              </a:buClr>
+              <a:buSzPct val="76000"/>
+              <a:buFont typeface="Wingdings 2" pitchFamily="18" charset="2"/>
+              <a:buChar char=""/>
+              <a:defRPr sz="1400" kern="1200">
+                <a:solidFill>
+                  <a:schemeClr val="tx2"/>
+                </a:solidFill>
+                <a:latin typeface="+mn-lt"/>
+                <a:ea typeface="+mn-ea"/>
+                <a:cs typeface="+mn-cs"/>
+              </a:defRPr>
+            </a:lvl6pPr>
+            <a:lvl7pPr marL="1719072" indent="-228600" algn="l" defTabSz="914400" rtl="0" eaLnBrk="1" latinLnBrk="0" hangingPunct="1">
+              <a:spcBef>
+                <a:spcPct val="20000"/>
+              </a:spcBef>
+              <a:buClr>
+                <a:schemeClr val="accent1"/>
+              </a:buClr>
+              <a:buSzPct val="76000"/>
+              <a:buFont typeface="Wingdings 2" pitchFamily="18" charset="2"/>
+              <a:buChar char=""/>
+              <a:defRPr sz="1400" kern="1200">
+                <a:solidFill>
+                  <a:schemeClr val="tx2"/>
+                </a:solidFill>
+                <a:latin typeface="+mn-lt"/>
+                <a:ea typeface="+mn-ea"/>
+                <a:cs typeface="+mn-cs"/>
+              </a:defRPr>
+            </a:lvl7pPr>
+            <a:lvl8pPr marL="1920240" indent="-228600" algn="l" defTabSz="914400" rtl="0" eaLnBrk="1" latinLnBrk="0" hangingPunct="1">
+              <a:spcBef>
+                <a:spcPct val="20000"/>
+              </a:spcBef>
+              <a:buClr>
+                <a:schemeClr val="accent1"/>
+              </a:buClr>
+              <a:buSzPct val="76000"/>
+              <a:buFont typeface="Wingdings 2" pitchFamily="18" charset="2"/>
+              <a:buChar char=""/>
+              <a:defRPr sz="1400" kern="1200">
+                <a:solidFill>
+                  <a:schemeClr val="tx2"/>
+                </a:solidFill>
+                <a:latin typeface="+mn-lt"/>
+                <a:ea typeface="+mn-ea"/>
+                <a:cs typeface="+mn-cs"/>
+              </a:defRPr>
+            </a:lvl8pPr>
+            <a:lvl9pPr marL="2121408" indent="-228600" algn="l" defTabSz="914400" rtl="0" eaLnBrk="1" latinLnBrk="0" hangingPunct="1">
+              <a:spcBef>
+                <a:spcPct val="20000"/>
+              </a:spcBef>
+              <a:buClr>
+                <a:schemeClr val="accent1"/>
+              </a:buClr>
+              <a:buSzPct val="76000"/>
+              <a:buFont typeface="Wingdings 2" pitchFamily="18" charset="2"/>
+              <a:buChar char=""/>
+              <a:defRPr sz="1400" kern="1200">
+                <a:solidFill>
+                  <a:schemeClr val="tx2"/>
+                </a:solidFill>
+                <a:latin typeface="+mn-lt"/>
+                <a:ea typeface="+mn-ea"/>
+                <a:cs typeface="+mn-cs"/>
+              </a:defRPr>
+            </a:lvl9pPr>
+          </a:lstStyle>
+          <a:p>
+            <a:r>
+              <a:rPr lang="fr-FR" dirty="0" smtClean="0"/>
+              <a:t>Performances optimales</a:t>
+            </a:r>
+          </a:p>
+          <a:p>
+            <a:endParaRPr lang="fr-FR" dirty="0" smtClean="0"/>
+          </a:p>
+          <a:p>
+            <a:r>
+              <a:rPr lang="fr-FR" dirty="0" smtClean="0"/>
+              <a:t>« Look and </a:t>
+            </a:r>
+            <a:r>
+              <a:rPr lang="fr-FR" dirty="0" err="1" smtClean="0"/>
+              <a:t>Feel</a:t>
+            </a:r>
+            <a:r>
+              <a:rPr lang="fr-FR" dirty="0" smtClean="0"/>
+              <a:t> » attendu</a:t>
+            </a:r>
+          </a:p>
+          <a:p>
+            <a:endParaRPr lang="fr-FR" dirty="0"/>
+          </a:p>
+          <a:p>
+            <a:r>
+              <a:rPr lang="fr-FR" dirty="0" smtClean="0"/>
+              <a:t>80% de code commun</a:t>
+            </a:r>
+          </a:p>
+          <a:p>
+            <a:pPr lvl="1"/>
+            <a:r>
+              <a:rPr lang="fr-FR" dirty="0" smtClean="0"/>
+              <a:t>Réduction des coûts</a:t>
+            </a:r>
+          </a:p>
+          <a:p>
+            <a:pPr lvl="2"/>
+            <a:r>
+              <a:rPr lang="fr-FR" dirty="0" smtClean="0"/>
+              <a:t>Maintenance</a:t>
+            </a:r>
+          </a:p>
+          <a:p>
+            <a:pPr lvl="2"/>
+            <a:r>
+              <a:rPr lang="fr-FR" dirty="0" smtClean="0"/>
+              <a:t>Recrutement</a:t>
+            </a:r>
+          </a:p>
+          <a:p>
+            <a:pPr lvl="2"/>
+            <a:r>
+              <a:rPr lang="fr-FR" dirty="0" smtClean="0"/>
+              <a:t>Formation</a:t>
+            </a:r>
+          </a:p>
+          <a:p>
+            <a:endParaRPr lang="fr-FR" dirty="0"/>
+          </a:p>
+          <a:p>
+            <a:r>
+              <a:rPr lang="fr-FR" dirty="0" smtClean="0"/>
+              <a:t>Mise sur le marché rapide</a:t>
+            </a:r>
+          </a:p>
+          <a:p>
+            <a:pPr lvl="1"/>
+            <a:r>
+              <a:rPr lang="fr-FR" dirty="0" smtClean="0"/>
+              <a:t>Moins de code</a:t>
+            </a:r>
+          </a:p>
+          <a:p>
+            <a:pPr lvl="1"/>
+            <a:r>
+              <a:rPr lang="fr-FR" dirty="0" smtClean="0"/>
+              <a:t>Equipes rapidement opérationnelles</a:t>
+            </a:r>
+            <a:endParaRPr lang="fr-FR" dirty="0"/>
+          </a:p>
+          <a:p>
+            <a:endParaRPr lang="fr-FR" dirty="0" smtClean="0"/>
+          </a:p>
+        </p:txBody>
+      </p:sp>
+      <p:pic>
+        <p:nvPicPr>
+          <p:cNvPr id="11" name="Picture 10"/>
+          <p:cNvPicPr>
+            <a:picLocks noChangeAspect="1"/>
+          </p:cNvPicPr>
+          <p:nvPr/>
+        </p:nvPicPr>
+        <p:blipFill>
+          <a:blip r:embed="rId4">
+            <a:extLst>
+              <a:ext uri="{28A0092B-C50C-407E-A947-70E740481C1C}">
+                <a14:useLocalDpi xmlns:a14="http://schemas.microsoft.com/office/drawing/2010/main" val="0"/>
+              </a:ext>
+            </a:extLst>
+          </a:blip>
+          <a:stretch>
+            <a:fillRect/>
+          </a:stretch>
+        </p:blipFill>
+        <p:spPr>
+          <a:xfrm>
+            <a:off x="5415973" y="1685835"/>
+            <a:ext cx="2987962" cy="4129500"/>
+          </a:xfrm>
+          <a:prstGeom prst="rect">
+            <a:avLst/>
+          </a:prstGeom>
+        </p:spPr>
+      </p:pic>
+    </p:spTree>
+    <p:extLst>
+      <p:ext uri="{BB962C8B-B14F-4D97-AF65-F5344CB8AC3E}">
+        <p14:creationId xmlns:p14="http://schemas.microsoft.com/office/powerpoint/2010/main" val="3915744507"/>
       </p:ext>
     </p:extLst>
   </p:cSld>
@@ -45274,9 +45486,12 @@
 </file>
 
 <file path=customXml/item1.xml><?xml version="1.0" encoding="utf-8"?>
-<p:properties xmlns:p="http://schemas.microsoft.com/office/2006/metadata/properties" xmlns:xsi="http://www.w3.org/2001/XMLSchema-instance" xmlns:pc="http://schemas.microsoft.com/office/infopath/2007/PartnerControls">
-  <documentManagement/>
-</p:properties>
+<?mso-contentType ?>
+<FormTemplates xmlns="http://schemas.microsoft.com/sharepoint/v3/contenttype/forms">
+  <Display>DocumentLibraryForm</Display>
+  <Edit>DocumentLibraryForm</Edit>
+  <New>DocumentLibraryForm</New>
+</FormTemplates>
 </file>
 
 <file path=customXml/item2.xml><?xml version="1.0" encoding="utf-8"?>
@@ -45394,25 +45609,15 @@
 </file>
 
 <file path=customXml/item3.xml><?xml version="1.0" encoding="utf-8"?>
-<?mso-contentType ?>
-<FormTemplates xmlns="http://schemas.microsoft.com/sharepoint/v3/contenttype/forms">
-  <Display>DocumentLibraryForm</Display>
-  <Edit>DocumentLibraryForm</Edit>
-  <New>DocumentLibraryForm</New>
-</FormTemplates>
+<p:properties xmlns:p="http://schemas.microsoft.com/office/2006/metadata/properties" xmlns:xsi="http://www.w3.org/2001/XMLSchema-instance" xmlns:pc="http://schemas.microsoft.com/office/infopath/2007/PartnerControls">
+  <documentManagement/>
+</p:properties>
 </file>
 
 <file path=customXml/itemProps1.xml><?xml version="1.0" encoding="utf-8"?>
-<ds:datastoreItem xmlns:ds="http://schemas.openxmlformats.org/officeDocument/2006/customXml" ds:itemID="{176084FE-F284-4DDE-9DBD-17DB9BB863FC}">
+<ds:datastoreItem xmlns:ds="http://schemas.openxmlformats.org/officeDocument/2006/customXml" ds:itemID="{ACC94498-2BE0-4B2C-A09C-1B689C7594D3}">
   <ds:schemaRefs>
-    <ds:schemaRef ds:uri="http://schemas.microsoft.com/office/2006/metadata/properties"/>
-    <ds:schemaRef ds:uri="http://purl.org/dc/terms/"/>
-    <ds:schemaRef ds:uri="http://purl.org/dc/elements/1.1/"/>
-    <ds:schemaRef ds:uri="http://www.w3.org/XML/1998/namespace"/>
-    <ds:schemaRef ds:uri="http://schemas.microsoft.com/office/2006/documentManagement/types"/>
-    <ds:schemaRef ds:uri="http://schemas.microsoft.com/office/infopath/2007/PartnerControls"/>
-    <ds:schemaRef ds:uri="http://schemas.openxmlformats.org/package/2006/metadata/core-properties"/>
-    <ds:schemaRef ds:uri="http://purl.org/dc/dcmitype/"/>
+    <ds:schemaRef ds:uri="http://schemas.microsoft.com/sharepoint/v3/contenttype/forms"/>
   </ds:schemaRefs>
 </ds:datastoreItem>
 </file>
@@ -45434,9 +45639,16 @@
 </file>
 
 <file path=customXml/itemProps3.xml><?xml version="1.0" encoding="utf-8"?>
-<ds:datastoreItem xmlns:ds="http://schemas.openxmlformats.org/officeDocument/2006/customXml" ds:itemID="{ACC94498-2BE0-4B2C-A09C-1B689C7594D3}">
+<ds:datastoreItem xmlns:ds="http://schemas.openxmlformats.org/officeDocument/2006/customXml" ds:itemID="{176084FE-F284-4DDE-9DBD-17DB9BB863FC}">
   <ds:schemaRefs>
-    <ds:schemaRef ds:uri="http://schemas.microsoft.com/sharepoint/v3/contenttype/forms"/>
+    <ds:schemaRef ds:uri="http://schemas.microsoft.com/office/2006/metadata/properties"/>
+    <ds:schemaRef ds:uri="http://purl.org/dc/terms/"/>
+    <ds:schemaRef ds:uri="http://purl.org/dc/elements/1.1/"/>
+    <ds:schemaRef ds:uri="http://www.w3.org/XML/1998/namespace"/>
+    <ds:schemaRef ds:uri="http://schemas.microsoft.com/office/2006/documentManagement/types"/>
+    <ds:schemaRef ds:uri="http://schemas.microsoft.com/office/infopath/2007/PartnerControls"/>
+    <ds:schemaRef ds:uri="http://schemas.openxmlformats.org/package/2006/metadata/core-properties"/>
+    <ds:schemaRef ds:uri="http://purl.org/dc/dcmitype/"/>
   </ds:schemaRefs>
 </ds:datastoreItem>
 </file>
</xml_diff>